<commit_message>
Add options to presentation
</commit_message>
<xml_diff>
--- a/Presentation.pptx
+++ b/Presentation.pptx
@@ -5,14 +5,17 @@
     <p:sldMasterId id="2147483666" r:id="rId1"/>
   </p:sldMasterIdLst>
   <p:notesMasterIdLst>
-    <p:notesMasterId r:id="rId7"/>
+    <p:notesMasterId r:id="rId10"/>
   </p:notesMasterIdLst>
   <p:sldIdLst>
     <p:sldId id="308" r:id="rId2"/>
     <p:sldId id="257" r:id="rId3"/>
     <p:sldId id="309" r:id="rId4"/>
     <p:sldId id="310" r:id="rId5"/>
-    <p:sldId id="285" r:id="rId6"/>
+    <p:sldId id="311" r:id="rId6"/>
+    <p:sldId id="312" r:id="rId7"/>
+    <p:sldId id="313" r:id="rId8"/>
+    <p:sldId id="285" r:id="rId9"/>
   </p:sldIdLst>
   <p:sldSz cx="9144000" cy="6858000" type="screen4x3"/>
   <p:notesSz cx="6858000" cy="9144000"/>
@@ -5829,7 +5832,6 @@
               <a:rPr lang="en-US" dirty="0"/>
               <a:t>Project purpose</a:t>
             </a:r>
-            <a:endParaRPr lang="en-US" dirty="0"/>
           </a:p>
         </p:txBody>
       </p:sp>
@@ -6117,6 +6119,514 @@
 </file>
 
 <file path=ppt/slides/slide5.xml><?xml version="1.0" encoding="utf-8"?>
+<p:sld xmlns:a="http://schemas.openxmlformats.org/drawingml/2006/main" xmlns:r="http://schemas.openxmlformats.org/officeDocument/2006/relationships" xmlns:p="http://schemas.openxmlformats.org/presentationml/2006/main">
+  <p:cSld>
+    <p:spTree>
+      <p:nvGrpSpPr>
+        <p:cNvPr id="1" name=""/>
+        <p:cNvGrpSpPr/>
+        <p:nvPr/>
+      </p:nvGrpSpPr>
+      <p:grpSpPr>
+        <a:xfrm>
+          <a:off x="0" y="0"/>
+          <a:ext cx="0" cy="0"/>
+          <a:chOff x="0" y="0"/>
+          <a:chExt cx="0" cy="0"/>
+        </a:xfrm>
+      </p:grpSpPr>
+      <p:sp>
+        <p:nvSpPr>
+          <p:cNvPr id="2" name="Title 1"/>
+          <p:cNvSpPr>
+            <a:spLocks noGrp="1"/>
+          </p:cNvSpPr>
+          <p:nvPr>
+            <p:ph type="title"/>
+          </p:nvPr>
+        </p:nvSpPr>
+        <p:spPr>
+          <a:xfrm>
+            <a:off x="228600" y="830943"/>
+            <a:ext cx="8686800" cy="838200"/>
+          </a:xfrm>
+        </p:spPr>
+        <p:txBody>
+          <a:bodyPr/>
+          <a:lstStyle/>
+          <a:p>
+            <a:pPr algn="l"/>
+            <a:r>
+              <a:rPr lang="en-US" dirty="0" smtClean="0"/>
+              <a:t>Options							1/3</a:t>
+            </a:r>
+            <a:endParaRPr lang="en-US" dirty="0"/>
+          </a:p>
+        </p:txBody>
+      </p:sp>
+      <p:sp>
+        <p:nvSpPr>
+          <p:cNvPr id="3" name="Content Placeholder 2"/>
+          <p:cNvSpPr>
+            <a:spLocks noGrp="1"/>
+          </p:cNvSpPr>
+          <p:nvPr>
+            <p:ph idx="1"/>
+          </p:nvPr>
+        </p:nvSpPr>
+        <p:spPr>
+          <a:xfrm>
+            <a:off x="228600" y="1669144"/>
+            <a:ext cx="8686800" cy="4905828"/>
+          </a:xfrm>
+        </p:spPr>
+        <p:txBody>
+          <a:bodyPr/>
+          <a:lstStyle/>
+          <a:p>
+            <a:r>
+              <a:rPr lang="en-US" dirty="0">
+                <a:effectLst/>
+              </a:rPr>
+              <a:t>Greeting</a:t>
+            </a:r>
+            <a:endParaRPr lang="bg-BG" dirty="0">
+              <a:effectLst/>
+            </a:endParaRPr>
+          </a:p>
+          <a:p>
+            <a:r>
+              <a:rPr lang="en-US" dirty="0">
+                <a:effectLst/>
+              </a:rPr>
+              <a:t>Line</a:t>
+            </a:r>
+            <a:endParaRPr lang="bg-BG" dirty="0">
+              <a:effectLst/>
+            </a:endParaRPr>
+          </a:p>
+          <a:p>
+            <a:pPr lvl="1"/>
+            <a:r>
+              <a:rPr lang="en-US" dirty="0">
+                <a:effectLst/>
+              </a:rPr>
+              <a:t>Width</a:t>
+            </a:r>
+            <a:endParaRPr lang="bg-BG" dirty="0">
+              <a:effectLst/>
+            </a:endParaRPr>
+          </a:p>
+          <a:p>
+            <a:pPr lvl="1"/>
+            <a:r>
+              <a:rPr lang="en-US" dirty="0">
+                <a:effectLst/>
+              </a:rPr>
+              <a:t>Shadow</a:t>
+            </a:r>
+            <a:endParaRPr lang="bg-BG" dirty="0">
+              <a:effectLst/>
+            </a:endParaRPr>
+          </a:p>
+          <a:p>
+            <a:r>
+              <a:rPr lang="en-US" dirty="0">
+                <a:effectLst/>
+              </a:rPr>
+              <a:t>Timings</a:t>
+            </a:r>
+            <a:endParaRPr lang="bg-BG" dirty="0">
+              <a:effectLst/>
+            </a:endParaRPr>
+          </a:p>
+          <a:p>
+            <a:pPr lvl="1"/>
+            <a:r>
+              <a:rPr lang="en-US" dirty="0">
+                <a:effectLst/>
+              </a:rPr>
+              <a:t>Timer Total</a:t>
+            </a:r>
+            <a:endParaRPr lang="bg-BG" dirty="0">
+              <a:effectLst/>
+            </a:endParaRPr>
+          </a:p>
+          <a:p>
+            <a:pPr lvl="1"/>
+            <a:r>
+              <a:rPr lang="en-US" dirty="0">
+                <a:effectLst/>
+              </a:rPr>
+              <a:t>Timer Tick</a:t>
+            </a:r>
+            <a:endParaRPr lang="bg-BG" dirty="0">
+              <a:effectLst/>
+            </a:endParaRPr>
+          </a:p>
+        </p:txBody>
+      </p:sp>
+    </p:spTree>
+    <p:extLst>
+      <p:ext uri="{BB962C8B-B14F-4D97-AF65-F5344CB8AC3E}">
+        <p14:creationId xmlns:p14="http://schemas.microsoft.com/office/powerpoint/2010/main" val="2803695186"/>
+      </p:ext>
+    </p:extLst>
+  </p:cSld>
+  <p:clrMapOvr>
+    <a:masterClrMapping/>
+  </p:clrMapOvr>
+  <p:timing>
+    <p:tnLst>
+      <p:par>
+        <p:cTn id="1" dur="indefinite" restart="never" nodeType="tmRoot"/>
+      </p:par>
+    </p:tnLst>
+  </p:timing>
+</p:sld>
+</file>
+
+<file path=ppt/slides/slide6.xml><?xml version="1.0" encoding="utf-8"?>
+<p:sld xmlns:a="http://schemas.openxmlformats.org/drawingml/2006/main" xmlns:r="http://schemas.openxmlformats.org/officeDocument/2006/relationships" xmlns:p="http://schemas.openxmlformats.org/presentationml/2006/main">
+  <p:cSld>
+    <p:spTree>
+      <p:nvGrpSpPr>
+        <p:cNvPr id="1" name=""/>
+        <p:cNvGrpSpPr/>
+        <p:nvPr/>
+      </p:nvGrpSpPr>
+      <p:grpSpPr>
+        <a:xfrm>
+          <a:off x="0" y="0"/>
+          <a:ext cx="0" cy="0"/>
+          <a:chOff x="0" y="0"/>
+          <a:chExt cx="0" cy="0"/>
+        </a:xfrm>
+      </p:grpSpPr>
+      <p:sp>
+        <p:nvSpPr>
+          <p:cNvPr id="2" name="Title 1"/>
+          <p:cNvSpPr>
+            <a:spLocks noGrp="1"/>
+          </p:cNvSpPr>
+          <p:nvPr>
+            <p:ph type="title"/>
+          </p:nvPr>
+        </p:nvSpPr>
+        <p:spPr>
+          <a:xfrm>
+            <a:off x="228600" y="830943"/>
+            <a:ext cx="8686800" cy="838200"/>
+          </a:xfrm>
+        </p:spPr>
+        <p:txBody>
+          <a:bodyPr/>
+          <a:lstStyle/>
+          <a:p>
+            <a:pPr algn="l"/>
+            <a:r>
+              <a:rPr lang="en-US" dirty="0"/>
+              <a:t>Options				</a:t>
+            </a:r>
+            <a:r>
+              <a:rPr lang="en-US" dirty="0" smtClean="0"/>
+              <a:t>	</a:t>
+            </a:r>
+            <a:r>
+              <a:rPr lang="en-US" dirty="0"/>
+              <a:t>		</a:t>
+            </a:r>
+            <a:r>
+              <a:rPr lang="en-US" dirty="0" smtClean="0"/>
+              <a:t>2/3</a:t>
+            </a:r>
+            <a:endParaRPr lang="en-US" dirty="0"/>
+          </a:p>
+        </p:txBody>
+      </p:sp>
+      <p:sp>
+        <p:nvSpPr>
+          <p:cNvPr id="3" name="Content Placeholder 2"/>
+          <p:cNvSpPr>
+            <a:spLocks noGrp="1"/>
+          </p:cNvSpPr>
+          <p:nvPr>
+            <p:ph idx="1"/>
+          </p:nvPr>
+        </p:nvSpPr>
+        <p:spPr>
+          <a:xfrm>
+            <a:off x="228600" y="1669144"/>
+            <a:ext cx="8686800" cy="4905828"/>
+          </a:xfrm>
+        </p:spPr>
+        <p:txBody>
+          <a:bodyPr/>
+          <a:lstStyle/>
+          <a:p>
+            <a:r>
+              <a:rPr lang="en-US" dirty="0">
+                <a:effectLst/>
+              </a:rPr>
+              <a:t>Firework</a:t>
+            </a:r>
+            <a:endParaRPr lang="bg-BG" dirty="0">
+              <a:effectLst/>
+            </a:endParaRPr>
+          </a:p>
+          <a:p>
+            <a:pPr lvl="1"/>
+            <a:r>
+              <a:rPr lang="en-US" dirty="0">
+                <a:effectLst/>
+              </a:rPr>
+              <a:t>Trail</a:t>
+            </a:r>
+            <a:endParaRPr lang="bg-BG" dirty="0">
+              <a:effectLst/>
+            </a:endParaRPr>
+          </a:p>
+          <a:p>
+            <a:pPr lvl="1"/>
+            <a:r>
+              <a:rPr lang="en-US" dirty="0">
+                <a:effectLst/>
+              </a:rPr>
+              <a:t>Speed</a:t>
+            </a:r>
+            <a:endParaRPr lang="bg-BG" dirty="0">
+              <a:effectLst/>
+            </a:endParaRPr>
+          </a:p>
+          <a:p>
+            <a:pPr lvl="1"/>
+            <a:r>
+              <a:rPr lang="en-US" dirty="0">
+                <a:effectLst/>
+              </a:rPr>
+              <a:t>Acceleration</a:t>
+            </a:r>
+            <a:endParaRPr lang="bg-BG" dirty="0">
+              <a:effectLst/>
+            </a:endParaRPr>
+          </a:p>
+          <a:p>
+            <a:pPr lvl="1"/>
+            <a:r>
+              <a:rPr lang="en-US" dirty="0">
+                <a:effectLst/>
+              </a:rPr>
+              <a:t>Target Radius</a:t>
+            </a:r>
+            <a:endParaRPr lang="bg-BG" dirty="0">
+              <a:effectLst/>
+            </a:endParaRPr>
+          </a:p>
+          <a:p>
+            <a:pPr lvl="1"/>
+            <a:r>
+              <a:rPr lang="en-US" dirty="0">
+                <a:effectLst/>
+              </a:rPr>
+              <a:t>Show Target</a:t>
+            </a:r>
+            <a:endParaRPr lang="bg-BG" dirty="0">
+              <a:effectLst/>
+            </a:endParaRPr>
+          </a:p>
+        </p:txBody>
+      </p:sp>
+    </p:spTree>
+    <p:extLst>
+      <p:ext uri="{BB962C8B-B14F-4D97-AF65-F5344CB8AC3E}">
+        <p14:creationId xmlns:p14="http://schemas.microsoft.com/office/powerpoint/2010/main" val="1222271389"/>
+      </p:ext>
+    </p:extLst>
+  </p:cSld>
+  <p:clrMapOvr>
+    <a:masterClrMapping/>
+  </p:clrMapOvr>
+  <p:timing>
+    <p:tnLst>
+      <p:par>
+        <p:cTn id="1" dur="indefinite" restart="never" nodeType="tmRoot"/>
+      </p:par>
+    </p:tnLst>
+  </p:timing>
+</p:sld>
+</file>
+
+<file path=ppt/slides/slide7.xml><?xml version="1.0" encoding="utf-8"?>
+<p:sld xmlns:a="http://schemas.openxmlformats.org/drawingml/2006/main" xmlns:r="http://schemas.openxmlformats.org/officeDocument/2006/relationships" xmlns:p="http://schemas.openxmlformats.org/presentationml/2006/main">
+  <p:cSld>
+    <p:spTree>
+      <p:nvGrpSpPr>
+        <p:cNvPr id="1" name=""/>
+        <p:cNvGrpSpPr/>
+        <p:nvPr/>
+      </p:nvGrpSpPr>
+      <p:grpSpPr>
+        <a:xfrm>
+          <a:off x="0" y="0"/>
+          <a:ext cx="0" cy="0"/>
+          <a:chOff x="0" y="0"/>
+          <a:chExt cx="0" cy="0"/>
+        </a:xfrm>
+      </p:grpSpPr>
+      <p:sp>
+        <p:nvSpPr>
+          <p:cNvPr id="2" name="Title 1"/>
+          <p:cNvSpPr>
+            <a:spLocks noGrp="1"/>
+          </p:cNvSpPr>
+          <p:nvPr>
+            <p:ph type="title"/>
+          </p:nvPr>
+        </p:nvSpPr>
+        <p:spPr>
+          <a:xfrm>
+            <a:off x="228600" y="830943"/>
+            <a:ext cx="8686800" cy="838200"/>
+          </a:xfrm>
+        </p:spPr>
+        <p:txBody>
+          <a:bodyPr/>
+          <a:lstStyle/>
+          <a:p>
+            <a:pPr algn="l"/>
+            <a:r>
+              <a:rPr lang="en-US" dirty="0"/>
+              <a:t>Options			</a:t>
+            </a:r>
+            <a:r>
+              <a:rPr lang="en-US" dirty="0" smtClean="0"/>
+              <a:t>	</a:t>
+            </a:r>
+            <a:r>
+              <a:rPr lang="en-US" dirty="0"/>
+              <a:t>			</a:t>
+            </a:r>
+            <a:r>
+              <a:rPr lang="en-US" dirty="0" smtClean="0"/>
+              <a:t>3/3</a:t>
+            </a:r>
+            <a:endParaRPr lang="en-US" dirty="0"/>
+          </a:p>
+        </p:txBody>
+      </p:sp>
+      <p:sp>
+        <p:nvSpPr>
+          <p:cNvPr id="3" name="Content Placeholder 2"/>
+          <p:cNvSpPr>
+            <a:spLocks noGrp="1"/>
+          </p:cNvSpPr>
+          <p:nvPr>
+            <p:ph idx="1"/>
+          </p:nvPr>
+        </p:nvSpPr>
+        <p:spPr>
+          <a:xfrm>
+            <a:off x="228600" y="1669144"/>
+            <a:ext cx="8686800" cy="4905828"/>
+          </a:xfrm>
+        </p:spPr>
+        <p:txBody>
+          <a:bodyPr/>
+          <a:lstStyle/>
+          <a:p>
+            <a:r>
+              <a:rPr lang="en-US" dirty="0">
+                <a:effectLst/>
+              </a:rPr>
+              <a:t>Particle</a:t>
+            </a:r>
+            <a:endParaRPr lang="bg-BG" dirty="0">
+              <a:effectLst/>
+            </a:endParaRPr>
+          </a:p>
+          <a:p>
+            <a:pPr lvl="1"/>
+            <a:r>
+              <a:rPr lang="en-US" dirty="0">
+                <a:effectLst/>
+              </a:rPr>
+              <a:t>Trail</a:t>
+            </a:r>
+            <a:endParaRPr lang="bg-BG" dirty="0">
+              <a:effectLst/>
+            </a:endParaRPr>
+          </a:p>
+          <a:p>
+            <a:pPr lvl="1"/>
+            <a:r>
+              <a:rPr lang="en-US" dirty="0">
+                <a:effectLst/>
+              </a:rPr>
+              <a:t>Count</a:t>
+            </a:r>
+            <a:endParaRPr lang="bg-BG" dirty="0">
+              <a:effectLst/>
+            </a:endParaRPr>
+          </a:p>
+          <a:p>
+            <a:pPr lvl="1"/>
+            <a:r>
+              <a:rPr lang="en-US" dirty="0">
+                <a:effectLst/>
+              </a:rPr>
+              <a:t>Friction</a:t>
+            </a:r>
+            <a:endParaRPr lang="bg-BG" dirty="0">
+              <a:effectLst/>
+            </a:endParaRPr>
+          </a:p>
+          <a:p>
+            <a:pPr lvl="1"/>
+            <a:r>
+              <a:rPr lang="en-US" dirty="0">
+                <a:effectLst/>
+              </a:rPr>
+              <a:t>Gravity</a:t>
+            </a:r>
+            <a:endParaRPr lang="bg-BG" dirty="0">
+              <a:effectLst/>
+            </a:endParaRPr>
+          </a:p>
+          <a:p>
+            <a:pPr lvl="1"/>
+            <a:r>
+              <a:rPr lang="en-US" dirty="0">
+                <a:effectLst/>
+              </a:rPr>
+              <a:t>Alpha</a:t>
+            </a:r>
+            <a:endParaRPr lang="bg-BG" dirty="0">
+              <a:effectLst/>
+            </a:endParaRPr>
+          </a:p>
+        </p:txBody>
+      </p:sp>
+    </p:spTree>
+    <p:extLst>
+      <p:ext uri="{BB962C8B-B14F-4D97-AF65-F5344CB8AC3E}">
+        <p14:creationId xmlns:p14="http://schemas.microsoft.com/office/powerpoint/2010/main" val="2005377953"/>
+      </p:ext>
+    </p:extLst>
+  </p:cSld>
+  <p:clrMapOvr>
+    <a:masterClrMapping/>
+  </p:clrMapOvr>
+  <p:timing>
+    <p:tnLst>
+      <p:par>
+        <p:cTn id="1" dur="indefinite" restart="never" nodeType="tmRoot"/>
+      </p:par>
+    </p:tnLst>
+  </p:timing>
+</p:sld>
+</file>
+
+<file path=ppt/slides/slide8.xml><?xml version="1.0" encoding="utf-8"?>
 <p:sld xmlns:a="http://schemas.openxmlformats.org/drawingml/2006/main" xmlns:r="http://schemas.openxmlformats.org/officeDocument/2006/relationships" xmlns:p="http://schemas.openxmlformats.org/presentationml/2006/main">
   <p:cSld>
     <p:spTree>

</xml_diff>

<commit_message>
changed the things that were changed in the project
</commit_message>
<xml_diff>
--- a/Presentation.pptx
+++ b/Presentation.pptx
@@ -116,7 +116,7 @@
   </p:defaultTextStyle>
   <p:extLst>
     <p:ext uri="{EFAFB233-063F-42B5-8137-9DF3F51BA10A}">
-      <p15:sldGuideLst xmlns:p15="http://schemas.microsoft.com/office/powerpoint/2012/main">
+      <p15:sldGuideLst xmlns:p15="http://schemas.microsoft.com/office/powerpoint/2012/main" xmlns="">
         <p15:guide id="1" orient="horz" pos="2160">
           <p15:clr>
             <a:srgbClr val="A4A3A4"/>
@@ -5990,109 +5990,154 @@
           <a:bodyPr/>
           <a:lstStyle/>
           <a:p>
-            <a:r>
-              <a:rPr lang="en-US" dirty="0" smtClean="0">
-                <a:effectLst/>
-              </a:rPr>
-              <a:t>Max </a:t>
-            </a:r>
-            <a:r>
-              <a:rPr lang="en-US" dirty="0">
+            <a:pPr>
+              <a:lnSpc>
+                <a:spcPct val="100000"/>
+              </a:lnSpc>
+            </a:pPr>
+            <a:r>
+              <a:rPr lang="en-US" sz="3000" dirty="0">
+                <a:effectLst/>
+              </a:rPr>
+              <a:t>Super </a:t>
+            </a:r>
+            <a:r>
+              <a:rPr lang="en-US" sz="3000" dirty="0" smtClean="0">
+                <a:effectLst/>
+              </a:rPr>
+              <a:t>Sonic</a:t>
+            </a:r>
+          </a:p>
+          <a:p>
+            <a:pPr>
+              <a:lnSpc>
+                <a:spcPct val="100000"/>
+              </a:lnSpc>
+            </a:pPr>
+            <a:r>
+              <a:rPr lang="en-US" sz="3000" dirty="0" smtClean="0">
+                <a:effectLst/>
+              </a:rPr>
+              <a:t>Rain Effect</a:t>
+            </a:r>
+          </a:p>
+          <a:p>
+            <a:pPr>
+              <a:lnSpc>
+                <a:spcPct val="100000"/>
+              </a:lnSpc>
+            </a:pPr>
+            <a:r>
+              <a:rPr lang="en-US" sz="3000" dirty="0" smtClean="0">
+                <a:effectLst/>
+              </a:rPr>
+              <a:t>Inversed </a:t>
+            </a:r>
+            <a:r>
+              <a:rPr lang="en-US" sz="3000" dirty="0">
                 <a:effectLst/>
               </a:rPr>
               <a:t>Gravity</a:t>
             </a:r>
-            <a:endParaRPr lang="bg-BG" dirty="0">
+            <a:endParaRPr lang="bg-BG" sz="3000" dirty="0">
               <a:effectLst/>
             </a:endParaRPr>
           </a:p>
           <a:p>
-            <a:r>
-              <a:rPr lang="en-US" dirty="0" smtClean="0">
-                <a:effectLst/>
-              </a:rPr>
-              <a:t>Inversed </a:t>
-            </a:r>
-            <a:r>
-              <a:rPr lang="en-US" dirty="0">
-                <a:effectLst/>
-              </a:rPr>
-              <a:t>Gravity</a:t>
-            </a:r>
-            <a:endParaRPr lang="bg-BG" dirty="0">
+            <a:pPr>
+              <a:lnSpc>
+                <a:spcPct val="100000"/>
+              </a:lnSpc>
+            </a:pPr>
+            <a:r>
+              <a:rPr lang="en-US" sz="3000" dirty="0" smtClean="0">
+                <a:effectLst/>
+              </a:rPr>
+              <a:t>Rocket </a:t>
+            </a:r>
+            <a:r>
+              <a:rPr lang="en-US" sz="3000" dirty="0">
+                <a:effectLst/>
+              </a:rPr>
+              <a:t>Launcher </a:t>
+            </a:r>
+            <a:endParaRPr lang="bg-BG" sz="3000" dirty="0">
               <a:effectLst/>
             </a:endParaRPr>
           </a:p>
           <a:p>
-            <a:r>
-              <a:rPr lang="en-US" dirty="0" smtClean="0">
-                <a:effectLst/>
-              </a:rPr>
-              <a:t>Rocket </a:t>
-            </a:r>
-            <a:r>
-              <a:rPr lang="en-US" dirty="0">
-                <a:effectLst/>
-              </a:rPr>
-              <a:t>Launcher </a:t>
-            </a:r>
-            <a:endParaRPr lang="bg-BG" dirty="0">
+            <a:pPr>
+              <a:lnSpc>
+                <a:spcPct val="100000"/>
+              </a:lnSpc>
+            </a:pPr>
+            <a:r>
+              <a:rPr lang="en-US" sz="3000" dirty="0" smtClean="0">
+                <a:effectLst/>
+              </a:rPr>
+              <a:t>New </a:t>
+            </a:r>
+            <a:r>
+              <a:rPr lang="en-US" sz="3000" dirty="0">
+                <a:effectLst/>
+              </a:rPr>
+              <a:t>Year</a:t>
+            </a:r>
+            <a:endParaRPr lang="bg-BG" sz="3000" dirty="0">
               <a:effectLst/>
             </a:endParaRPr>
           </a:p>
           <a:p>
-            <a:r>
-              <a:rPr lang="en-US" dirty="0" smtClean="0">
-                <a:effectLst/>
-              </a:rPr>
-              <a:t>New </a:t>
-            </a:r>
-            <a:r>
-              <a:rPr lang="en-US" dirty="0">
-                <a:effectLst/>
-              </a:rPr>
-              <a:t>Year</a:t>
-            </a:r>
-            <a:endParaRPr lang="bg-BG" dirty="0">
+            <a:pPr>
+              <a:lnSpc>
+                <a:spcPct val="100000"/>
+              </a:lnSpc>
+            </a:pPr>
+            <a:r>
+              <a:rPr lang="en-US" sz="3000" dirty="0" smtClean="0">
+                <a:effectLst/>
+              </a:rPr>
+              <a:t>Distortion</a:t>
+            </a:r>
+            <a:endParaRPr lang="bg-BG" sz="3000" dirty="0">
               <a:effectLst/>
             </a:endParaRPr>
           </a:p>
           <a:p>
-            <a:r>
-              <a:rPr lang="en-US" dirty="0" smtClean="0">
-                <a:effectLst/>
-              </a:rPr>
-              <a:t>Distortion</a:t>
-            </a:r>
-            <a:endParaRPr lang="bg-BG" dirty="0">
+            <a:pPr>
+              <a:lnSpc>
+                <a:spcPct val="100000"/>
+              </a:lnSpc>
+            </a:pPr>
+            <a:r>
+              <a:rPr lang="en-US" sz="3000" dirty="0" smtClean="0">
+                <a:effectLst/>
+              </a:rPr>
+              <a:t>Exploding </a:t>
+            </a:r>
+            <a:r>
+              <a:rPr lang="en-US" sz="3000" dirty="0">
+                <a:effectLst/>
+              </a:rPr>
+              <a:t>Star</a:t>
+            </a:r>
+            <a:endParaRPr lang="bg-BG" sz="3000" dirty="0">
               <a:effectLst/>
             </a:endParaRPr>
           </a:p>
           <a:p>
-            <a:r>
-              <a:rPr lang="en-US" dirty="0" smtClean="0">
-                <a:effectLst/>
-              </a:rPr>
-              <a:t>Exploding </a:t>
-            </a:r>
-            <a:r>
-              <a:rPr lang="en-US" dirty="0">
-                <a:effectLst/>
-              </a:rPr>
-              <a:t>Star</a:t>
-            </a:r>
-            <a:endParaRPr lang="bg-BG" dirty="0">
-              <a:effectLst/>
-            </a:endParaRPr>
-          </a:p>
-          <a:p>
-            <a:r>
-              <a:rPr lang="en-US" dirty="0" smtClean="0">
+            <a:pPr>
+              <a:lnSpc>
+                <a:spcPct val="100000"/>
+              </a:lnSpc>
+            </a:pPr>
+            <a:r>
+              <a:rPr lang="en-US" sz="3000" dirty="0" smtClean="0">
                 <a:effectLst/>
               </a:rPr>
               <a:t>Super Nova and more…</a:t>
             </a:r>
-            <a:endParaRPr lang="bg-BG" dirty="0">
+            <a:endParaRPr lang="bg-BG" sz="3000" dirty="0">
               <a:effectLst/>
             </a:endParaRPr>
           </a:p>
@@ -6246,19 +6291,13 @@
               <a:rPr lang="en-US" dirty="0">
                 <a:effectLst/>
               </a:rPr>
-              <a:t>Timer Total</a:t>
-            </a:r>
-            <a:endParaRPr lang="bg-BG" dirty="0">
-              <a:effectLst/>
-            </a:endParaRPr>
-          </a:p>
-          <a:p>
-            <a:pPr lvl="1"/>
-            <a:r>
-              <a:rPr lang="en-US" dirty="0">
-                <a:effectLst/>
-              </a:rPr>
-              <a:t>Timer Tick</a:t>
+              <a:t>Timer </a:t>
+            </a:r>
+            <a:r>
+              <a:rPr lang="en-US" dirty="0" smtClean="0">
+                <a:effectLst/>
+              </a:rPr>
+              <a:t>Total</a:t>
             </a:r>
             <a:endParaRPr lang="bg-BG" dirty="0">
               <a:effectLst/>
@@ -7040,7 +7079,7 @@
   <a:extraClrSchemeLst/>
   <a:extLst>
     <a:ext uri="{05A4C25C-085E-4340-85A3-A5531E510DB2}">
-      <thm15:themeFamily xmlns:thm15="http://schemas.microsoft.com/office/thememl/2012/main" name="Telerik Academy theme" id="{2620D71C-A5FD-46E0-A488-16D4CF22AEE2}" vid="{F028A4D3-6851-4D6D-A82D-72CBFB9A818D}"/>
+      <thm15:themeFamily xmlns:thm15="http://schemas.microsoft.com/office/thememl/2012/main" xmlns="" name="Telerik Academy theme" id="{2620D71C-A5FD-46E0-A488-16D4CF22AEE2}" vid="{F028A4D3-6851-4D6D-A82D-72CBFB9A818D}"/>
     </a:ext>
   </a:extLst>
 </a:theme>
@@ -7301,7 +7340,7 @@
   <a:extraClrSchemeLst/>
   <a:extLst>
     <a:ext uri="{05A4C25C-085E-4340-85A3-A5531E510DB2}">
-      <thm15:themeFamily xmlns:thm15="http://schemas.microsoft.com/office/thememl/2012/main" name="Office Theme" id="{62F939B6-93AF-4DB8-9C6B-D6C7DFDC589F}" vid="{4A3C46E8-61CC-4603-A589-7422A47A8E4A}"/>
+      <thm15:themeFamily xmlns:thm15="http://schemas.microsoft.com/office/thememl/2012/main" xmlns="" name="Office Theme" id="{62F939B6-93AF-4DB8-9C6B-D6C7DFDC589F}" vid="{4A3C46E8-61CC-4603-A589-7422A47A8E4A}"/>
     </a:ext>
   </a:extLst>
 </a:theme>

</xml_diff>